<commit_message>
Roughly calibrate for zone temperature
</commit_message>
<xml_diff>
--- a/AixLib/Systems/EONERC_Testhall/Assumptions_and_Modelling.pptx
+++ b/AixLib/Systems/EONERC_Testhall/Assumptions_and_Modelling.pptx
@@ -12070,7 +12070,7 @@
               <a:pPr>
                 <a:defRPr/>
               </a:pPr>
-              <a:t>23.01.2024</a:t>
+              <a:t>25.01.2024</a:t>
             </a:fld>
             <a:endParaRPr lang="de-DE" sz="1000" dirty="0">
               <a:latin typeface="Arial" pitchFamily="34" charset="0"/>
@@ -12299,7 +12299,7 @@
               <a:pPr>
                 <a:defRPr/>
               </a:pPr>
-              <a:t>23.01.2024</a:t>
+              <a:t>25.01.2024</a:t>
             </a:fld>
             <a:endParaRPr lang="de-DE" dirty="0"/>
           </a:p>
@@ -22048,21 +22048,77 @@
                   <a:srgbClr val="FF0000"/>
                 </a:solidFill>
               </a:rPr>
-              <a:t> verbinden und simulationsfähige Modelle der </a:t>
-            </a:r>
-            <a:r>
-              <a:rPr lang="de-DE">
+              <a:t> verbinden und simulationsfähige Modelle der Subsysteme erstellen</a:t>
+            </a:r>
+          </a:p>
+          <a:p>
+            <a:pPr marL="717750" lvl="1" indent="-285750">
+              <a:buFont typeface="Arial" panose="020B0604020202020204" pitchFamily="34" charset="0"/>
+              <a:buChar char="•"/>
+            </a:pPr>
+            <a:r>
+              <a:rPr lang="de-DE" dirty="0">
                 <a:solidFill>
                   <a:srgbClr val="FF0000"/>
                 </a:solidFill>
               </a:rPr>
-              <a:t>Subsysteme erstellen</a:t>
-            </a:r>
+              <a:t>Für Winter- und Sommerbedingungen jeweils ein </a:t>
+            </a:r>
+            <a:r>
+              <a:rPr lang="de-DE" dirty="0" err="1">
+                <a:solidFill>
+                  <a:srgbClr val="FF0000"/>
+                </a:solidFill>
+              </a:rPr>
+              <a:t>Example</a:t>
+            </a:r>
+            <a:r>
+              <a:rPr lang="de-DE" dirty="0">
+                <a:solidFill>
+                  <a:srgbClr val="FF0000"/>
+                </a:solidFill>
+              </a:rPr>
+              <a:t> (kurze Zeiteinheiten)</a:t>
+            </a:r>
+          </a:p>
+          <a:p>
+            <a:pPr marL="717750" lvl="1" indent="-285750">
+              <a:buFont typeface="Arial" panose="020B0604020202020204" pitchFamily="34" charset="0"/>
+              <a:buChar char="•"/>
+            </a:pPr>
+            <a:r>
+              <a:rPr lang="de-DE" dirty="0">
+                <a:solidFill>
+                  <a:srgbClr val="FF0000"/>
+                </a:solidFill>
+              </a:rPr>
+              <a:t>Für Kalibrierung/Validierung verwenden</a:t>
+            </a:r>
+          </a:p>
+          <a:p>
+            <a:pPr marL="717750" lvl="1" indent="-285750">
+              <a:buFont typeface="Arial" panose="020B0604020202020204" pitchFamily="34" charset="0"/>
+              <a:buChar char="•"/>
+            </a:pPr>
             <a:endParaRPr lang="de-DE" dirty="0">
               <a:solidFill>
                 <a:srgbClr val="FF0000"/>
               </a:solidFill>
             </a:endParaRPr>
+          </a:p>
+          <a:p>
+            <a:pPr marL="717750" lvl="1" indent="-285750">
+              <a:buFont typeface="Arial" panose="020B0604020202020204" pitchFamily="34" charset="0"/>
+              <a:buChar char="•"/>
+            </a:pPr>
+            <a:r>
+              <a:rPr lang="de-DE" dirty="0">
+                <a:solidFill>
+                  <a:srgbClr val="FF0000"/>
+                </a:solidFill>
+              </a:rPr>
+              <a:t>Sauberes Propagieren der Parameter</a:t>
+            </a:r>
           </a:p>
         </p:txBody>
       </p:sp>
@@ -24646,19 +24702,7 @@
               <a:rPr lang="de-DE" dirty="0">
                 <a:sym typeface="Wingdings" panose="05000000000000000000" pitchFamily="2" charset="2"/>
               </a:rPr>
-              <a:t> – </a:t>
-            </a:r>
-            <a:r>
-              <a:rPr lang="de-DE" dirty="0" err="1">
-                <a:sym typeface="Wingdings" panose="05000000000000000000" pitchFamily="2" charset="2"/>
-              </a:rPr>
-              <a:t>Verlegeplan</a:t>
-            </a:r>
-            <a:r>
-              <a:rPr lang="de-DE" dirty="0">
-                <a:sym typeface="Wingdings" panose="05000000000000000000" pitchFamily="2" charset="2"/>
-              </a:rPr>
-              <a:t> BKT: </a:t>
+              <a:t> – Verlegeplan BKT: </a:t>
             </a:r>
           </a:p>
           <a:p>
@@ -24677,36 +24721,6 @@
                 <a:sym typeface="Wingdings" panose="05000000000000000000" pitchFamily="2" charset="2"/>
               </a:rPr>
               <a:t>Druckverluste pro Verteiler bei bis 238mbar 126bar (Summe: 1004mbar≈1bar)</a:t>
-            </a:r>
-          </a:p>
-          <a:p>
-            <a:pPr lvl="1"/>
-            <a:r>
-              <a:rPr lang="de-DE" dirty="0" err="1">
-                <a:sym typeface="Wingdings" panose="05000000000000000000" pitchFamily="2" charset="2"/>
-              </a:rPr>
-              <a:t>Kv</a:t>
-            </a:r>
-            <a:r>
-              <a:rPr lang="de-DE" dirty="0">
-                <a:sym typeface="Wingdings" panose="05000000000000000000" pitchFamily="2" charset="2"/>
-              </a:rPr>
-              <a:t> (m³/h/(bar)^0,5) (bei 1bar)</a:t>
-            </a:r>
-          </a:p>
-          <a:p>
-            <a:pPr lvl="1"/>
-            <a:r>
-              <a:rPr lang="de-DE" dirty="0" err="1">
-                <a:sym typeface="Wingdings" panose="05000000000000000000" pitchFamily="2" charset="2"/>
-              </a:rPr>
-              <a:t>Kv</a:t>
-            </a:r>
-            <a:r>
-              <a:rPr lang="de-DE" dirty="0">
-                <a:sym typeface="Wingdings" panose="05000000000000000000" pitchFamily="2" charset="2"/>
-              </a:rPr>
-              <a:t>=2,34 </a:t>
             </a:r>
           </a:p>
           <a:p>
@@ -24718,8 +24732,11 @@
                 </a:solidFill>
                 <a:sym typeface="Wingdings" panose="05000000000000000000" pitchFamily="2" charset="2"/>
               </a:rPr>
-              <a:t>Könnte auch nochmal gegen geprüft werden</a:t>
-            </a:r>
+              <a:t>Druckverluste im Modell prüfen</a:t>
+            </a:r>
+            <a:endParaRPr lang="de-DE" dirty="0">
+              <a:sym typeface="Wingdings" panose="05000000000000000000" pitchFamily="2" charset="2"/>
+            </a:endParaRPr>
           </a:p>
           <a:p>
             <a:pPr marL="285750" indent="-285750">
@@ -24728,45 +24745,12 @@
             </a:pPr>
             <a:r>
               <a:rPr lang="de-DE" dirty="0">
+                <a:solidFill>
+                  <a:srgbClr val="FF0000"/>
+                </a:solidFill>
                 <a:sym typeface="Wingdings" panose="05000000000000000000" pitchFamily="2" charset="2"/>
               </a:rPr>
-              <a:t>CCA eigentlich zum Heizen und Kühlen eingesetzt, sobald Kühlwasserverteiler implementiert ist, kann theoretisch TABS Modell der </a:t>
-            </a:r>
-            <a:r>
-              <a:rPr lang="de-DE" dirty="0" err="1">
-                <a:sym typeface="Wingdings" panose="05000000000000000000" pitchFamily="2" charset="2"/>
-              </a:rPr>
-              <a:t>AixLib</a:t>
-            </a:r>
-            <a:r>
-              <a:rPr lang="de-DE" dirty="0">
-                <a:sym typeface="Wingdings" panose="05000000000000000000" pitchFamily="2" charset="2"/>
-              </a:rPr>
-              <a:t> verwendet werden (</a:t>
-            </a:r>
-            <a:r>
-              <a:rPr lang="de-DE" dirty="0" err="1">
-                <a:sym typeface="Wingdings" panose="05000000000000000000" pitchFamily="2" charset="2"/>
-              </a:rPr>
-              <a:t>AixLib</a:t>
-            </a:r>
-            <a:r>
-              <a:rPr lang="de-DE" dirty="0">
-                <a:sym typeface="Wingdings" panose="05000000000000000000" pitchFamily="2" charset="2"/>
-              </a:rPr>
-              <a:t>/Systems/TABS/</a:t>
-            </a:r>
-            <a:r>
-              <a:rPr lang="de-DE" dirty="0" err="1">
-                <a:sym typeface="Wingdings" panose="05000000000000000000" pitchFamily="2" charset="2"/>
-              </a:rPr>
-              <a:t>tabs</a:t>
-            </a:r>
-            <a:r>
-              <a:rPr lang="de-DE" dirty="0">
-                <a:sym typeface="Wingdings" panose="05000000000000000000" pitchFamily="2" charset="2"/>
-              </a:rPr>
-              <a:t>)</a:t>
+              <a:t>Kv Wert von Ventil prüfen</a:t>
             </a:r>
           </a:p>
           <a:p>
@@ -24991,15 +24975,7 @@
             </a:pPr>
             <a:r>
               <a:rPr lang="de-DE" dirty="0"/>
-              <a:t>Nach Monitoring scheint die CPH oder TFH (Test Facility </a:t>
-            </a:r>
-            <a:r>
-              <a:rPr lang="de-DE" dirty="0" err="1"/>
-              <a:t>Heat</a:t>
-            </a:r>
-            <a:r>
-              <a:rPr lang="de-DE" dirty="0"/>
-              <a:t> </a:t>
+              <a:t>Nach Monitoring scheint die CPH oder TFH (Test Facility Heat </a:t>
             </a:r>
             <a:r>
               <a:rPr lang="de-DE" dirty="0">
@@ -25015,6 +24991,105 @@
                 <a:sym typeface="Wingdings" panose="05000000000000000000" pitchFamily="2" charset="2"/>
               </a:rPr>
               <a:t> Umgang mit diesem Problem noch überlegen</a:t>
+            </a:r>
+          </a:p>
+          <a:p>
+            <a:pPr marL="717750" lvl="1" indent="-285750">
+              <a:buFont typeface="Arial" panose="020B0604020202020204" pitchFamily="34" charset="0"/>
+              <a:buChar char="•"/>
+            </a:pPr>
+            <a:endParaRPr lang="de-DE" dirty="0">
+              <a:solidFill>
+                <a:schemeClr val="accent1"/>
+              </a:solidFill>
+              <a:sym typeface="Wingdings" panose="05000000000000000000" pitchFamily="2" charset="2"/>
+            </a:endParaRPr>
+          </a:p>
+          <a:p>
+            <a:pPr marL="285750" indent="-285750">
+              <a:buFont typeface="Arial" panose="020B0604020202020204" pitchFamily="34" charset="0"/>
+              <a:buChar char="•"/>
+            </a:pPr>
+            <a:r>
+              <a:rPr lang="de-DE" dirty="0">
+                <a:solidFill>
+                  <a:schemeClr val="accent1"/>
+                </a:solidFill>
+                <a:sym typeface="Wingdings" panose="05000000000000000000" pitchFamily="2" charset="2"/>
+              </a:rPr>
+              <a:t>Anmerkung </a:t>
+            </a:r>
+            <a:r>
+              <a:rPr lang="de-DE" dirty="0" err="1">
+                <a:solidFill>
+                  <a:schemeClr val="accent1"/>
+                </a:solidFill>
+                <a:sym typeface="Wingdings" panose="05000000000000000000" pitchFamily="2" charset="2"/>
+              </a:rPr>
+              <a:t>fse</a:t>
+            </a:r>
+            <a:r>
+              <a:rPr lang="de-DE" dirty="0">
+                <a:solidFill>
+                  <a:schemeClr val="accent1"/>
+                </a:solidFill>
+                <a:sym typeface="Wingdings" panose="05000000000000000000" pitchFamily="2" charset="2"/>
+              </a:rPr>
+              <a:t>:</a:t>
+            </a:r>
+          </a:p>
+          <a:p>
+            <a:pPr marL="717750" lvl="1" indent="-285750">
+              <a:buFont typeface="Arial" panose="020B0604020202020204" pitchFamily="34" charset="0"/>
+              <a:buChar char="•"/>
+            </a:pPr>
+            <a:r>
+              <a:rPr lang="de-DE" dirty="0">
+                <a:solidFill>
+                  <a:schemeClr val="accent1"/>
+                </a:solidFill>
+                <a:sym typeface="Wingdings" panose="05000000000000000000" pitchFamily="2" charset="2"/>
+              </a:rPr>
+              <a:t>Vorlauftemperaturen zu hoch</a:t>
+            </a:r>
+          </a:p>
+          <a:p>
+            <a:pPr marL="717750" lvl="1" indent="-285750">
+              <a:buFont typeface="Arial" panose="020B0604020202020204" pitchFamily="34" charset="0"/>
+              <a:buChar char="•"/>
+            </a:pPr>
+            <a:r>
+              <a:rPr lang="de-DE" dirty="0">
+                <a:solidFill>
+                  <a:schemeClr val="accent1"/>
+                </a:solidFill>
+                <a:sym typeface="Wingdings" panose="05000000000000000000" pitchFamily="2" charset="2"/>
+              </a:rPr>
+              <a:t>Zu starke Schwingungen im FW-Netz (90-120°C)</a:t>
+            </a:r>
+          </a:p>
+          <a:p>
+            <a:pPr marL="717750" lvl="1" indent="-285750">
+              <a:buFont typeface="Arial" panose="020B0604020202020204" pitchFamily="34" charset="0"/>
+              <a:buChar char="•"/>
+            </a:pPr>
+            <a:r>
+              <a:rPr lang="de-DE" dirty="0">
+                <a:solidFill>
+                  <a:schemeClr val="accent1"/>
+                </a:solidFill>
+                <a:sym typeface="Wingdings" panose="05000000000000000000" pitchFamily="2" charset="2"/>
+              </a:rPr>
+              <a:t>Evtl. Modellierung über </a:t>
+            </a:r>
+            <a:r>
+              <a:rPr lang="de-DE" dirty="0" err="1">
+                <a:solidFill>
+                  <a:schemeClr val="accent1"/>
+                </a:solidFill>
+                <a:sym typeface="Wingdings" panose="05000000000000000000" pitchFamily="2" charset="2"/>
+              </a:rPr>
+              <a:t>boundaries</a:t>
             </a:r>
             <a:endParaRPr lang="de-DE" dirty="0">
               <a:solidFill>
@@ -25133,57 +25208,6 @@
             <a:r>
               <a:rPr lang="de-DE" dirty="0"/>
               <a:t>Drehzahlen konstant</a:t>
-            </a:r>
-          </a:p>
-          <a:p>
-            <a:pPr marL="285750" indent="-285750">
-              <a:buFont typeface="Arial" panose="020B0604020202020204" pitchFamily="34" charset="0"/>
-              <a:buChar char="•"/>
-            </a:pPr>
-            <a:endParaRPr lang="de-DE" dirty="0"/>
-          </a:p>
-          <a:p>
-            <a:pPr marL="285750" indent="-285750">
-              <a:buFont typeface="Arial" panose="020B0604020202020204" pitchFamily="34" charset="0"/>
-              <a:buChar char="•"/>
-            </a:pPr>
-            <a:r>
-              <a:rPr lang="de-DE" dirty="0">
-                <a:solidFill>
-                  <a:srgbClr val="FF0000"/>
-                </a:solidFill>
-              </a:rPr>
-              <a:t>Anmerkung </a:t>
-            </a:r>
-            <a:r>
-              <a:rPr lang="de-DE" dirty="0" err="1">
-                <a:solidFill>
-                  <a:srgbClr val="FF0000"/>
-                </a:solidFill>
-              </a:rPr>
-              <a:t>fse</a:t>
-            </a:r>
-            <a:r>
-              <a:rPr lang="de-DE" dirty="0">
-                <a:solidFill>
-                  <a:srgbClr val="FF0000"/>
-                </a:solidFill>
-              </a:rPr>
-              <a:t>:</a:t>
-            </a:r>
-          </a:p>
-          <a:p>
-            <a:pPr marL="717750" lvl="1" indent="-285750">
-              <a:buFont typeface="Arial" panose="020B0604020202020204" pitchFamily="34" charset="0"/>
-              <a:buChar char="•"/>
-            </a:pPr>
-            <a:r>
-              <a:rPr lang="de-DE" dirty="0">
-                <a:solidFill>
-                  <a:srgbClr val="FF0000"/>
-                </a:solidFill>
-              </a:rPr>
-              <a:t>Regelung der AHU in generellen Regelungsblock übernehmen</a:t>
             </a:r>
           </a:p>
         </p:txBody>
@@ -26342,7 +26366,7 @@
                 </a:solidFill>
                 <a:sym typeface="Wingdings" panose="05000000000000000000" pitchFamily="2" charset="2"/>
               </a:rPr>
-              <a:t>Regelung für Supply Temperatur vorsehen</a:t>
+              <a:t>Regelung für Supply Temperatur vorsehen (eventuell noch etwas in Obsolete vorhanden)</a:t>
             </a:r>
             <a:endParaRPr lang="de-DE" dirty="0">
               <a:solidFill>

</xml_diff>